<commit_message>
adding aerverless api for style config
</commit_message>
<xml_diff>
--- a/docs/MultiTenant App.pptx
+++ b/docs/MultiTenant App.pptx
@@ -7047,6 +7047,13 @@
           <a:prstGeom prst="line">
             <a:avLst/>
           </a:prstGeom>
+          <a:ln>
+            <a:solidFill>
+              <a:schemeClr val="bg1">
+                <a:lumMod val="75000"/>
+              </a:schemeClr>
+            </a:solidFill>
+          </a:ln>
         </p:spPr>
         <p:style>
           <a:lnRef idx="1">
@@ -7077,6 +7084,13 @@
           <a:prstGeom prst="line">
             <a:avLst/>
           </a:prstGeom>
+          <a:ln>
+            <a:solidFill>
+              <a:schemeClr val="bg1">
+                <a:lumMod val="75000"/>
+              </a:schemeClr>
+            </a:solidFill>
+          </a:ln>
         </p:spPr>
         <p:style>
           <a:lnRef idx="1">

</xml_diff>